<commit_message>
added some basic commands slides
</commit_message>
<xml_diff>
--- a/Git/Git Slides.pptx
+++ b/Git/Git Slides.pptx
@@ -8,6 +8,10 @@
     <p:sldId id="256" r:id="rId2"/>
     <p:sldId id="257" r:id="rId3"/>
     <p:sldId id="258" r:id="rId4"/>
+    <p:sldId id="259" r:id="rId5"/>
+    <p:sldId id="260" r:id="rId6"/>
+    <p:sldId id="261" r:id="rId7"/>
+    <p:sldId id="262" r:id="rId8"/>
   </p:sldIdLst>
   <p:sldSz cx="9144000" cy="6858000" type="screen4x3"/>
   <p:notesSz cx="6858000" cy="9144000"/>
@@ -5208,11 +5212,7 @@
           <a:p>
             <a:r>
               <a:rPr lang="en-US" dirty="0" smtClean="0"/>
-              <a:t>Sainsbury</a:t>
-            </a:r>
-            <a:r>
-              <a:rPr lang="en-US" dirty="0" smtClean="0"/>
-              <a:t>’s</a:t>
+              <a:t>Sainsbury’s</a:t>
             </a:r>
           </a:p>
           <a:p>
@@ -5348,6 +5348,461 @@
     <p:extLst>
       <p:ext uri="{BB962C8B-B14F-4D97-AF65-F5344CB8AC3E}">
         <p14:creationId xmlns:p14="http://schemas.microsoft.com/office/powerpoint/2010/main" val="1944261486"/>
+      </p:ext>
+    </p:extLst>
+  </p:cSld>
+  <p:clrMapOvr>
+    <a:masterClrMapping/>
+  </p:clrMapOvr>
+</p:sld>
+</file>
+
+<file path=ppt/slides/slide4.xml><?xml version="1.0" encoding="utf-8"?>
+<p:sld xmlns:a="http://schemas.openxmlformats.org/drawingml/2006/main" xmlns:r="http://schemas.openxmlformats.org/officeDocument/2006/relationships" xmlns:p="http://schemas.openxmlformats.org/presentationml/2006/main">
+  <p:cSld>
+    <p:spTree>
+      <p:nvGrpSpPr>
+        <p:cNvPr id="1" name=""/>
+        <p:cNvGrpSpPr/>
+        <p:nvPr/>
+      </p:nvGrpSpPr>
+      <p:grpSpPr>
+        <a:xfrm>
+          <a:off x="0" y="0"/>
+          <a:ext cx="0" cy="0"/>
+          <a:chOff x="0" y="0"/>
+          <a:chExt cx="0" cy="0"/>
+        </a:xfrm>
+      </p:grpSpPr>
+      <p:sp>
+        <p:nvSpPr>
+          <p:cNvPr id="2" name="Title 1"/>
+          <p:cNvSpPr>
+            <a:spLocks noGrp="1"/>
+          </p:cNvSpPr>
+          <p:nvPr>
+            <p:ph type="title"/>
+          </p:nvPr>
+        </p:nvSpPr>
+        <p:spPr/>
+        <p:txBody>
+          <a:bodyPr/>
+          <a:lstStyle/>
+          <a:p>
+            <a:r>
+              <a:rPr lang="en-US" dirty="0" err="1" smtClean="0"/>
+              <a:t>GiT</a:t>
+            </a:r>
+            <a:r>
+              <a:rPr lang="en-US" dirty="0" smtClean="0"/>
+              <a:t> - installation </a:t>
+            </a:r>
+            <a:endParaRPr lang="en-US" dirty="0"/>
+          </a:p>
+        </p:txBody>
+      </p:sp>
+      <p:sp>
+        <p:nvSpPr>
+          <p:cNvPr id="3" name="Content Placeholder 2"/>
+          <p:cNvSpPr>
+            <a:spLocks noGrp="1"/>
+          </p:cNvSpPr>
+          <p:nvPr>
+            <p:ph idx="1"/>
+          </p:nvPr>
+        </p:nvSpPr>
+        <p:spPr/>
+        <p:txBody>
+          <a:bodyPr/>
+          <a:lstStyle/>
+          <a:p>
+            <a:r>
+              <a:rPr lang="en-US" dirty="0" smtClean="0"/>
+              <a:t>Installation of </a:t>
+            </a:r>
+            <a:r>
+              <a:rPr lang="en-US" dirty="0" err="1" smtClean="0"/>
+              <a:t>GiT</a:t>
+            </a:r>
+            <a:r>
+              <a:rPr lang="en-US" dirty="0" smtClean="0"/>
+              <a:t> is quick and simple.</a:t>
+            </a:r>
+          </a:p>
+          <a:p>
+            <a:r>
+              <a:rPr lang="en-US" dirty="0" smtClean="0"/>
+              <a:t>Click on the link below</a:t>
+            </a:r>
+          </a:p>
+          <a:p>
+            <a:r>
+              <a:rPr lang="en-US" dirty="0" smtClean="0">
+                <a:hlinkClick r:id="rId2"/>
+              </a:rPr>
+              <a:t>https</a:t>
+            </a:r>
+            <a:r>
+              <a:rPr lang="en-US" dirty="0">
+                <a:hlinkClick r:id="rId2"/>
+              </a:rPr>
+              <a:t>://github.com/git-for-windows/git/releases/download/v2.5.1.windows.1/Git-2.5.1-64-</a:t>
+            </a:r>
+            <a:r>
+              <a:rPr lang="en-US" dirty="0" smtClean="0">
+                <a:hlinkClick r:id="rId2"/>
+              </a:rPr>
+              <a:t>bit.exe</a:t>
+            </a:r>
+            <a:endParaRPr lang="en-US" dirty="0" smtClean="0"/>
+          </a:p>
+          <a:p>
+            <a:r>
+              <a:rPr lang="en-US" dirty="0" smtClean="0"/>
+              <a:t>Launch the exe file, and install.</a:t>
+            </a:r>
+            <a:endParaRPr lang="en-US" dirty="0"/>
+          </a:p>
+        </p:txBody>
+      </p:sp>
+    </p:spTree>
+    <p:extLst>
+      <p:ext uri="{BB962C8B-B14F-4D97-AF65-F5344CB8AC3E}">
+        <p14:creationId xmlns:p14="http://schemas.microsoft.com/office/powerpoint/2010/main" val="2249661415"/>
+      </p:ext>
+    </p:extLst>
+  </p:cSld>
+  <p:clrMapOvr>
+    <a:masterClrMapping/>
+  </p:clrMapOvr>
+</p:sld>
+</file>
+
+<file path=ppt/slides/slide5.xml><?xml version="1.0" encoding="utf-8"?>
+<p:sld xmlns:a="http://schemas.openxmlformats.org/drawingml/2006/main" xmlns:r="http://schemas.openxmlformats.org/officeDocument/2006/relationships" xmlns:p="http://schemas.openxmlformats.org/presentationml/2006/main">
+  <p:cSld>
+    <p:spTree>
+      <p:nvGrpSpPr>
+        <p:cNvPr id="1" name=""/>
+        <p:cNvGrpSpPr/>
+        <p:nvPr/>
+      </p:nvGrpSpPr>
+      <p:grpSpPr>
+        <a:xfrm>
+          <a:off x="0" y="0"/>
+          <a:ext cx="0" cy="0"/>
+          <a:chOff x="0" y="0"/>
+          <a:chExt cx="0" cy="0"/>
+        </a:xfrm>
+      </p:grpSpPr>
+      <p:sp>
+        <p:nvSpPr>
+          <p:cNvPr id="2" name="Title 1"/>
+          <p:cNvSpPr>
+            <a:spLocks noGrp="1"/>
+          </p:cNvSpPr>
+          <p:nvPr>
+            <p:ph type="title"/>
+          </p:nvPr>
+        </p:nvSpPr>
+        <p:spPr/>
+        <p:txBody>
+          <a:bodyPr/>
+          <a:lstStyle/>
+          <a:p>
+            <a:r>
+              <a:rPr lang="en-US" dirty="0" err="1"/>
+              <a:t>GiT</a:t>
+            </a:r>
+            <a:r>
+              <a:rPr lang="en-US" dirty="0"/>
+              <a:t> – Basic Commands</a:t>
+            </a:r>
+          </a:p>
+        </p:txBody>
+      </p:sp>
+      <p:sp>
+        <p:nvSpPr>
+          <p:cNvPr id="3" name="Content Placeholder 2"/>
+          <p:cNvSpPr>
+            <a:spLocks noGrp="1"/>
+          </p:cNvSpPr>
+          <p:nvPr>
+            <p:ph idx="1"/>
+          </p:nvPr>
+        </p:nvSpPr>
+        <p:spPr/>
+        <p:txBody>
+          <a:bodyPr/>
+          <a:lstStyle/>
+          <a:p>
+            <a:r>
+              <a:rPr lang="en-US" dirty="0" err="1" smtClean="0"/>
+              <a:t>ls</a:t>
+            </a:r>
+            <a:r>
+              <a:rPr lang="en-US" dirty="0" smtClean="0"/>
+              <a:t> – shows you the directory you are currently working in</a:t>
+            </a:r>
+          </a:p>
+          <a:p>
+            <a:r>
+              <a:rPr lang="en-US" dirty="0" smtClean="0"/>
+              <a:t>cd </a:t>
+            </a:r>
+            <a:r>
+              <a:rPr lang="en-US" i="1" dirty="0" smtClean="0"/>
+              <a:t>filename</a:t>
+            </a:r>
+            <a:r>
+              <a:rPr lang="en-US" dirty="0" smtClean="0"/>
+              <a:t> – allows you to navigate to the selected file name</a:t>
+            </a:r>
+          </a:p>
+          <a:p>
+            <a:r>
+              <a:rPr lang="en-US" dirty="0" smtClean="0"/>
+              <a:t>cd .. – allows you to navigate the directory above where you currently are</a:t>
+            </a:r>
+          </a:p>
+          <a:p>
+            <a:r>
+              <a:rPr lang="en-US" dirty="0" smtClean="0"/>
+              <a:t>cd – allows you to go to root</a:t>
+            </a:r>
+          </a:p>
+        </p:txBody>
+      </p:sp>
+    </p:spTree>
+    <p:extLst>
+      <p:ext uri="{BB962C8B-B14F-4D97-AF65-F5344CB8AC3E}">
+        <p14:creationId xmlns:p14="http://schemas.microsoft.com/office/powerpoint/2010/main" val="1792104884"/>
+      </p:ext>
+    </p:extLst>
+  </p:cSld>
+  <p:clrMapOvr>
+    <a:masterClrMapping/>
+  </p:clrMapOvr>
+</p:sld>
+</file>
+
+<file path=ppt/slides/slide6.xml><?xml version="1.0" encoding="utf-8"?>
+<p:sld xmlns:a="http://schemas.openxmlformats.org/drawingml/2006/main" xmlns:r="http://schemas.openxmlformats.org/officeDocument/2006/relationships" xmlns:p="http://schemas.openxmlformats.org/presentationml/2006/main">
+  <p:cSld>
+    <p:spTree>
+      <p:nvGrpSpPr>
+        <p:cNvPr id="1" name=""/>
+        <p:cNvGrpSpPr/>
+        <p:nvPr/>
+      </p:nvGrpSpPr>
+      <p:grpSpPr>
+        <a:xfrm>
+          <a:off x="0" y="0"/>
+          <a:ext cx="0" cy="0"/>
+          <a:chOff x="0" y="0"/>
+          <a:chExt cx="0" cy="0"/>
+        </a:xfrm>
+      </p:grpSpPr>
+      <p:sp>
+        <p:nvSpPr>
+          <p:cNvPr id="2" name="Title 1"/>
+          <p:cNvSpPr>
+            <a:spLocks noGrp="1"/>
+          </p:cNvSpPr>
+          <p:nvPr>
+            <p:ph type="title"/>
+          </p:nvPr>
+        </p:nvSpPr>
+        <p:spPr/>
+        <p:txBody>
+          <a:bodyPr/>
+          <a:lstStyle/>
+          <a:p>
+            <a:r>
+              <a:rPr lang="en-US" dirty="0" err="1" smtClean="0"/>
+              <a:t>GiT</a:t>
+            </a:r>
+            <a:r>
+              <a:rPr lang="en-US" dirty="0"/>
+              <a:t> </a:t>
+            </a:r>
+            <a:r>
+              <a:rPr lang="en-US" dirty="0" smtClean="0"/>
+              <a:t>– Basic Commands</a:t>
+            </a:r>
+            <a:endParaRPr lang="en-US" dirty="0"/>
+          </a:p>
+        </p:txBody>
+      </p:sp>
+      <p:sp>
+        <p:nvSpPr>
+          <p:cNvPr id="3" name="Content Placeholder 2"/>
+          <p:cNvSpPr>
+            <a:spLocks noGrp="1"/>
+          </p:cNvSpPr>
+          <p:nvPr>
+            <p:ph idx="1"/>
+          </p:nvPr>
+        </p:nvSpPr>
+        <p:spPr/>
+        <p:txBody>
+          <a:bodyPr/>
+          <a:lstStyle/>
+          <a:p>
+            <a:r>
+              <a:rPr lang="en-US" dirty="0" err="1" smtClean="0"/>
+              <a:t>git</a:t>
+            </a:r>
+            <a:r>
+              <a:rPr lang="en-US" dirty="0" smtClean="0"/>
+              <a:t> status – Allows you to see the stage at what your repository is like compared to the shared repository.</a:t>
+            </a:r>
+          </a:p>
+          <a:p>
+            <a:r>
+              <a:rPr lang="en-US" dirty="0" err="1" smtClean="0"/>
+              <a:t>git</a:t>
+            </a:r>
+            <a:r>
+              <a:rPr lang="en-US" dirty="0" smtClean="0"/>
+              <a:t> pull – pulls the shared repository from </a:t>
+            </a:r>
+            <a:r>
+              <a:rPr lang="en-US" dirty="0" err="1" smtClean="0"/>
+              <a:t>GiThub</a:t>
+            </a:r>
+            <a:r>
+              <a:rPr lang="en-US" dirty="0" smtClean="0"/>
+              <a:t> and updates your local repository.</a:t>
+            </a:r>
+          </a:p>
+          <a:p>
+            <a:r>
+              <a:rPr lang="en-US" dirty="0" err="1" smtClean="0"/>
+              <a:t>git</a:t>
+            </a:r>
+            <a:r>
+              <a:rPr lang="en-US" dirty="0" smtClean="0"/>
+              <a:t> commit –m “insert message here” – this command snapshots the changes you want to make</a:t>
+            </a:r>
+            <a:endParaRPr lang="en-US" dirty="0"/>
+          </a:p>
+        </p:txBody>
+      </p:sp>
+    </p:spTree>
+    <p:extLst>
+      <p:ext uri="{BB962C8B-B14F-4D97-AF65-F5344CB8AC3E}">
+        <p14:creationId xmlns:p14="http://schemas.microsoft.com/office/powerpoint/2010/main" val="703725838"/>
+      </p:ext>
+    </p:extLst>
+  </p:cSld>
+  <p:clrMapOvr>
+    <a:masterClrMapping/>
+  </p:clrMapOvr>
+</p:sld>
+</file>
+
+<file path=ppt/slides/slide7.xml><?xml version="1.0" encoding="utf-8"?>
+<p:sld xmlns:a="http://schemas.openxmlformats.org/drawingml/2006/main" xmlns:r="http://schemas.openxmlformats.org/officeDocument/2006/relationships" xmlns:p="http://schemas.openxmlformats.org/presentationml/2006/main">
+  <p:cSld>
+    <p:spTree>
+      <p:nvGrpSpPr>
+        <p:cNvPr id="1" name=""/>
+        <p:cNvGrpSpPr/>
+        <p:nvPr/>
+      </p:nvGrpSpPr>
+      <p:grpSpPr>
+        <a:xfrm>
+          <a:off x="0" y="0"/>
+          <a:ext cx="0" cy="0"/>
+          <a:chOff x="0" y="0"/>
+          <a:chExt cx="0" cy="0"/>
+        </a:xfrm>
+      </p:grpSpPr>
+      <p:sp>
+        <p:nvSpPr>
+          <p:cNvPr id="2" name="Title 1"/>
+          <p:cNvSpPr>
+            <a:spLocks noGrp="1"/>
+          </p:cNvSpPr>
+          <p:nvPr>
+            <p:ph type="title"/>
+          </p:nvPr>
+        </p:nvSpPr>
+        <p:spPr/>
+        <p:txBody>
+          <a:bodyPr/>
+          <a:lstStyle/>
+          <a:p>
+            <a:r>
+              <a:rPr lang="en-US" dirty="0" err="1"/>
+              <a:t>GiT</a:t>
+            </a:r>
+            <a:r>
+              <a:rPr lang="en-US" dirty="0"/>
+              <a:t> – Basic Commands</a:t>
+            </a:r>
+          </a:p>
+        </p:txBody>
+      </p:sp>
+      <p:sp>
+        <p:nvSpPr>
+          <p:cNvPr id="3" name="Content Placeholder 2"/>
+          <p:cNvSpPr>
+            <a:spLocks noGrp="1"/>
+          </p:cNvSpPr>
+          <p:nvPr>
+            <p:ph idx="1"/>
+          </p:nvPr>
+        </p:nvSpPr>
+        <p:spPr/>
+        <p:txBody>
+          <a:bodyPr/>
+          <a:lstStyle/>
+          <a:p>
+            <a:r>
+              <a:rPr lang="en-US" dirty="0" err="1" smtClean="0"/>
+              <a:t>git</a:t>
+            </a:r>
+            <a:r>
+              <a:rPr lang="en-US" dirty="0" smtClean="0"/>
+              <a:t> add </a:t>
+            </a:r>
+            <a:r>
+              <a:rPr lang="en-US" i="1" dirty="0" smtClean="0"/>
+              <a:t>filename </a:t>
+            </a:r>
+            <a:r>
+              <a:rPr lang="en-US" dirty="0" smtClean="0"/>
+              <a:t>– takes a snapshot of the file</a:t>
+            </a:r>
+          </a:p>
+          <a:p>
+            <a:r>
+              <a:rPr lang="en-US" dirty="0" err="1" smtClean="0"/>
+              <a:t>git</a:t>
+            </a:r>
+            <a:r>
+              <a:rPr lang="en-US" dirty="0" smtClean="0"/>
+              <a:t> push – pushes the snapshots you have taken to the shared repository</a:t>
+            </a:r>
+          </a:p>
+          <a:p>
+            <a:pPr marL="0" indent="0" algn="ctr">
+              <a:buNone/>
+            </a:pPr>
+            <a:r>
+              <a:rPr lang="en-US" dirty="0" smtClean="0"/>
+              <a:t>WARNING – PUSHING CAN CAUSE CONFLICTS</a:t>
+            </a:r>
+            <a:endParaRPr lang="en-US" dirty="0"/>
+          </a:p>
+        </p:txBody>
+      </p:sp>
+    </p:spTree>
+    <p:extLst>
+      <p:ext uri="{BB962C8B-B14F-4D97-AF65-F5344CB8AC3E}">
+        <p14:creationId xmlns:p14="http://schemas.microsoft.com/office/powerpoint/2010/main" val="263441724"/>
       </p:ext>
     </p:extLst>
   </p:cSld>

</xml_diff>

<commit_message>
Jenkins + Git rules
</commit_message>
<xml_diff>
--- a/Git/Git Slides.pptx
+++ b/Git/Git Slides.pptx
@@ -6,12 +6,15 @@
   </p:sldMasterIdLst>
   <p:sldIdLst>
     <p:sldId id="256" r:id="rId2"/>
-    <p:sldId id="257" r:id="rId3"/>
-    <p:sldId id="258" r:id="rId4"/>
-    <p:sldId id="259" r:id="rId5"/>
-    <p:sldId id="260" r:id="rId6"/>
-    <p:sldId id="261" r:id="rId7"/>
-    <p:sldId id="262" r:id="rId8"/>
+    <p:sldId id="259" r:id="rId3"/>
+    <p:sldId id="260" r:id="rId4"/>
+    <p:sldId id="261" r:id="rId5"/>
+    <p:sldId id="262" r:id="rId6"/>
+    <p:sldId id="263" r:id="rId7"/>
+    <p:sldId id="264" r:id="rId8"/>
+    <p:sldId id="265" r:id="rId9"/>
+    <p:sldId id="266" r:id="rId10"/>
+    <p:sldId id="267" r:id="rId11"/>
   </p:sldIdLst>
   <p:sldSz cx="9144000" cy="6858000" type="screen4x3"/>
   <p:notesSz cx="6858000" cy="9144000"/>
@@ -740,7 +743,7 @@
           <a:p>
             <a:fld id="{70BA1CFD-BFF0-48BC-9BA5-4974D7A6AB15}" type="datetimeFigureOut">
               <a:rPr lang="en-US" smtClean="0"/>
-              <a:t>08/09/15</a:t>
+              <a:t>09/09/15</a:t>
             </a:fld>
             <a:endParaRPr lang="en-US"/>
           </a:p>
@@ -919,7 +922,7 @@
           <a:p>
             <a:fld id="{70BA1CFD-BFF0-48BC-9BA5-4974D7A6AB15}" type="datetimeFigureOut">
               <a:rPr lang="en-US" smtClean="0"/>
-              <a:t>08/09/15</a:t>
+              <a:t>09/09/15</a:t>
             </a:fld>
             <a:endParaRPr lang="en-US"/>
           </a:p>
@@ -1098,7 +1101,7 @@
           <a:p>
             <a:fld id="{70BA1CFD-BFF0-48BC-9BA5-4974D7A6AB15}" type="datetimeFigureOut">
               <a:rPr lang="en-US" smtClean="0"/>
-              <a:t>08/09/15</a:t>
+              <a:t>09/09/15</a:t>
             </a:fld>
             <a:endParaRPr lang="en-US"/>
           </a:p>
@@ -1263,7 +1266,7 @@
           <a:p>
             <a:fld id="{70BA1CFD-BFF0-48BC-9BA5-4974D7A6AB15}" type="datetimeFigureOut">
               <a:rPr lang="en-US" smtClean="0"/>
-              <a:t>08/09/15</a:t>
+              <a:t>09/09/15</a:t>
             </a:fld>
             <a:endParaRPr lang="en-US"/>
           </a:p>
@@ -1502,7 +1505,7 @@
           <a:p>
             <a:fld id="{70BA1CFD-BFF0-48BC-9BA5-4974D7A6AB15}" type="datetimeFigureOut">
               <a:rPr lang="en-US" smtClean="0"/>
-              <a:t>08/09/15</a:t>
+              <a:t>09/09/15</a:t>
             </a:fld>
             <a:endParaRPr lang="en-US"/>
           </a:p>
@@ -1615,7 +1618,7 @@
           <a:p>
             <a:fld id="{70BA1CFD-BFF0-48BC-9BA5-4974D7A6AB15}" type="datetimeFigureOut">
               <a:rPr lang="en-US" smtClean="0"/>
-              <a:t>08/09/15</a:t>
+              <a:t>09/09/15</a:t>
             </a:fld>
             <a:endParaRPr lang="en-US"/>
           </a:p>
@@ -1988,7 +1991,7 @@
           <a:p>
             <a:fld id="{70BA1CFD-BFF0-48BC-9BA5-4974D7A6AB15}" type="datetimeFigureOut">
               <a:rPr lang="en-US" smtClean="0"/>
-              <a:t>08/09/15</a:t>
+              <a:t>09/09/15</a:t>
             </a:fld>
             <a:endParaRPr lang="en-US"/>
           </a:p>
@@ -2215,7 +2218,7 @@
           <a:p>
             <a:fld id="{70BA1CFD-BFF0-48BC-9BA5-4974D7A6AB15}" type="datetimeFigureOut">
               <a:rPr lang="en-US" smtClean="0"/>
-              <a:t>08/09/15</a:t>
+              <a:t>09/09/15</a:t>
             </a:fld>
             <a:endParaRPr lang="en-US"/>
           </a:p>
@@ -2305,7 +2308,7 @@
           <a:p>
             <a:fld id="{70BA1CFD-BFF0-48BC-9BA5-4974D7A6AB15}" type="datetimeFigureOut">
               <a:rPr lang="en-US" smtClean="0"/>
-              <a:t>08/09/15</a:t>
+              <a:t>09/09/15</a:t>
             </a:fld>
             <a:endParaRPr lang="en-US"/>
           </a:p>
@@ -3132,7 +3135,7 @@
           <a:p>
             <a:fld id="{70BA1CFD-BFF0-48BC-9BA5-4974D7A6AB15}" type="datetimeFigureOut">
               <a:rPr lang="en-US" smtClean="0"/>
-              <a:t>08/09/15</a:t>
+              <a:t>09/09/15</a:t>
             </a:fld>
             <a:endParaRPr lang="en-US"/>
           </a:p>
@@ -3963,7 +3966,7 @@
           <a:p>
             <a:fld id="{70BA1CFD-BFF0-48BC-9BA5-4974D7A6AB15}" type="datetimeFigureOut">
               <a:rPr lang="en-US" smtClean="0"/>
-              <a:t>08/09/15</a:t>
+              <a:t>09/09/15</a:t>
             </a:fld>
             <a:endParaRPr lang="en-US"/>
           </a:p>
@@ -4617,7 +4620,7 @@
           <a:p>
             <a:fld id="{70BA1CFD-BFF0-48BC-9BA5-4974D7A6AB15}" type="datetimeFigureOut">
               <a:rPr lang="en-US" smtClean="0"/>
-              <a:t>08/09/15</a:t>
+              <a:t>09/09/15</a:t>
             </a:fld>
             <a:endParaRPr lang="en-US"/>
           </a:p>
@@ -5094,11 +5097,7 @@
           <a:p>
             <a:r>
               <a:rPr lang="en-US" dirty="0" err="1" smtClean="0"/>
-              <a:t>GiT</a:t>
-            </a:r>
-            <a:r>
-              <a:rPr lang="en-US" dirty="0" smtClean="0"/>
-              <a:t>, Jenkins, VM</a:t>
+              <a:t>Git</a:t>
             </a:r>
             <a:endParaRPr lang="en-US" dirty="0"/>
           </a:p>
@@ -5127,6 +5126,110 @@
     <p:extLst>
       <p:ext uri="{BB962C8B-B14F-4D97-AF65-F5344CB8AC3E}">
         <p14:creationId xmlns:p14="http://schemas.microsoft.com/office/powerpoint/2010/main" val="1315476100"/>
+      </p:ext>
+    </p:extLst>
+  </p:cSld>
+  <p:clrMapOvr>
+    <a:masterClrMapping/>
+  </p:clrMapOvr>
+</p:sld>
+</file>
+
+<file path=ppt/slides/slide10.xml><?xml version="1.0" encoding="utf-8"?>
+<p:sld xmlns:a="http://schemas.openxmlformats.org/drawingml/2006/main" xmlns:r="http://schemas.openxmlformats.org/officeDocument/2006/relationships" xmlns:p="http://schemas.openxmlformats.org/presentationml/2006/main">
+  <p:cSld>
+    <p:spTree>
+      <p:nvGrpSpPr>
+        <p:cNvPr id="1" name=""/>
+        <p:cNvGrpSpPr/>
+        <p:nvPr/>
+      </p:nvGrpSpPr>
+      <p:grpSpPr>
+        <a:xfrm>
+          <a:off x="0" y="0"/>
+          <a:ext cx="0" cy="0"/>
+          <a:chOff x="0" y="0"/>
+          <a:chExt cx="0" cy="0"/>
+        </a:xfrm>
+      </p:grpSpPr>
+      <p:sp>
+        <p:nvSpPr>
+          <p:cNvPr id="2" name="Title 1"/>
+          <p:cNvSpPr>
+            <a:spLocks noGrp="1"/>
+          </p:cNvSpPr>
+          <p:nvPr>
+            <p:ph type="title"/>
+          </p:nvPr>
+        </p:nvSpPr>
+        <p:spPr/>
+        <p:txBody>
+          <a:bodyPr/>
+          <a:lstStyle/>
+          <a:p>
+            <a:r>
+              <a:rPr lang="en-US" dirty="0" smtClean="0"/>
+              <a:t>More Rules of </a:t>
+            </a:r>
+            <a:r>
+              <a:rPr lang="en-US" dirty="0" err="1" smtClean="0"/>
+              <a:t>Git</a:t>
+            </a:r>
+            <a:endParaRPr lang="en-US" dirty="0"/>
+          </a:p>
+        </p:txBody>
+      </p:sp>
+      <p:sp>
+        <p:nvSpPr>
+          <p:cNvPr id="3" name="Content Placeholder 2"/>
+          <p:cNvSpPr>
+            <a:spLocks noGrp="1"/>
+          </p:cNvSpPr>
+          <p:nvPr>
+            <p:ph idx="1"/>
+          </p:nvPr>
+        </p:nvSpPr>
+        <p:spPr/>
+        <p:txBody>
+          <a:bodyPr/>
+          <a:lstStyle/>
+          <a:p>
+            <a:r>
+              <a:rPr lang="en-US" dirty="0" smtClean="0"/>
+              <a:t> If you have two pieces of separate functionality, that should be split into two commits</a:t>
+            </a:r>
+          </a:p>
+          <a:p>
+            <a:r>
+              <a:rPr lang="en-US" dirty="0" smtClean="0"/>
+              <a:t> Do not merge or delete unmerged branches without everyone else’s consent</a:t>
+            </a:r>
+          </a:p>
+          <a:p>
+            <a:r>
+              <a:rPr lang="en-US" dirty="0"/>
+              <a:t> </a:t>
+            </a:r>
+            <a:r>
+              <a:rPr lang="en-US" dirty="0" smtClean="0"/>
+              <a:t>Do not push files that are different for each user for example the .</a:t>
+            </a:r>
+            <a:r>
+              <a:rPr lang="en-US" dirty="0" err="1" smtClean="0"/>
+              <a:t>classpath</a:t>
+            </a:r>
+            <a:r>
+              <a:rPr lang="en-US" dirty="0" smtClean="0"/>
+              <a:t> file</a:t>
+            </a:r>
+            <a:endParaRPr lang="en-US" dirty="0"/>
+          </a:p>
+        </p:txBody>
+      </p:sp>
+    </p:spTree>
+    <p:extLst>
+      <p:ext uri="{BB962C8B-B14F-4D97-AF65-F5344CB8AC3E}">
+        <p14:creationId xmlns:p14="http://schemas.microsoft.com/office/powerpoint/2010/main" val="1896295814"/>
       </p:ext>
     </p:extLst>
   </p:cSld>
@@ -5192,90 +5295,62 @@
         </p:nvSpPr>
         <p:spPr/>
         <p:txBody>
-          <a:bodyPr>
-            <a:normAutofit fontScale="92500" lnSpcReduction="20000"/>
-          </a:bodyPr>
-          <a:lstStyle/>
-          <a:p>
+          <a:bodyPr/>
+          <a:lstStyle/>
+          <a:p>
+            <a:r>
+              <a:rPr lang="en-US" dirty="0" smtClean="0"/>
+              <a:t>Installation of </a:t>
+            </a:r>
             <a:r>
               <a:rPr lang="en-US" dirty="0" err="1" smtClean="0"/>
-              <a:t>Asda</a:t>
+              <a:t>GiT</a:t>
+            </a:r>
+            <a:r>
+              <a:rPr lang="en-US" dirty="0" smtClean="0"/>
+              <a:t> is quick and simple.</a:t>
+            </a:r>
+          </a:p>
+          <a:p>
+            <a:r>
+              <a:rPr lang="en-US" dirty="0" smtClean="0"/>
+              <a:t>Click on the link below</a:t>
+            </a:r>
+          </a:p>
+          <a:p>
+            <a:r>
+              <a:rPr lang="en-US" dirty="0" smtClean="0">
+                <a:hlinkClick r:id="rId2"/>
+              </a:rPr>
+              <a:t>https</a:t>
+            </a:r>
+            <a:r>
+              <a:rPr lang="en-US" dirty="0">
+                <a:hlinkClick r:id="rId2"/>
+              </a:rPr>
+              <a:t>://github.com/git-for-windows/git/releases/download/v2.5.1.windows.1/Git-2.5.1-64-</a:t>
+            </a:r>
+            <a:r>
+              <a:rPr lang="en-US" dirty="0" smtClean="0">
+                <a:hlinkClick r:id="rId2"/>
+              </a:rPr>
+              <a:t>bit.exe</a:t>
             </a:r>
             <a:endParaRPr lang="en-US" dirty="0" smtClean="0"/>
           </a:p>
           <a:p>
             <a:r>
               <a:rPr lang="en-US" dirty="0" smtClean="0"/>
-              <a:t>Tesco</a:t>
-            </a:r>
-          </a:p>
-          <a:p>
-            <a:r>
-              <a:rPr lang="en-US" dirty="0" smtClean="0"/>
-              <a:t>Sainsbury’s</a:t>
-            </a:r>
-          </a:p>
-          <a:p>
-            <a:r>
-              <a:rPr lang="en-US" dirty="0" err="1" smtClean="0"/>
-              <a:t>Morrisons</a:t>
-            </a:r>
-            <a:endParaRPr lang="en-US" dirty="0" smtClean="0"/>
-          </a:p>
-          <a:p>
-            <a:r>
-              <a:rPr lang="en-US" dirty="0" err="1" smtClean="0"/>
-              <a:t>Aldi</a:t>
-            </a:r>
-            <a:endParaRPr lang="en-US" dirty="0" smtClean="0"/>
-          </a:p>
-          <a:p>
-            <a:r>
-              <a:rPr lang="en-US" dirty="0" err="1" smtClean="0"/>
-              <a:t>Lidl</a:t>
-            </a:r>
-            <a:endParaRPr lang="en-US" dirty="0" smtClean="0"/>
-          </a:p>
-          <a:p>
-            <a:r>
-              <a:rPr lang="en-US" dirty="0" err="1" smtClean="0"/>
-              <a:t>Wilko</a:t>
-            </a:r>
-            <a:endParaRPr lang="en-US" dirty="0" smtClean="0"/>
-          </a:p>
-          <a:p>
-            <a:r>
-              <a:rPr lang="en-US" dirty="0" smtClean="0"/>
-              <a:t>Waitrose</a:t>
-            </a:r>
-          </a:p>
-          <a:p>
-            <a:r>
-              <a:rPr lang="en-US" dirty="0" smtClean="0"/>
-              <a:t>THE CLASSIC </a:t>
-            </a:r>
-            <a:r>
-              <a:rPr lang="en-US" dirty="0" smtClean="0">
-                <a:sym typeface="Wingdings"/>
-              </a:rPr>
-              <a:t> BOOOOOOTHS</a:t>
-            </a:r>
-          </a:p>
-          <a:p>
-            <a:r>
-              <a:rPr lang="en-US" dirty="0" smtClean="0">
-                <a:sym typeface="Wingdings"/>
-              </a:rPr>
-              <a:t>M&amp;S</a:t>
-            </a:r>
-            <a:endParaRPr lang="en-US" dirty="0" smtClean="0"/>
+              <a:t>Launch the exe file, and install.</a:t>
+            </a:r>
+            <a:endParaRPr lang="en-US" dirty="0"/>
           </a:p>
         </p:txBody>
       </p:sp>
     </p:spTree>
     <p:extLst>
       <p:ext uri="{BB962C8B-B14F-4D97-AF65-F5344CB8AC3E}">
-        <p14:creationId xmlns:p14="http://schemas.microsoft.com/office/powerpoint/2010/main" val="2569716299"/>
+        <p14:creationId xmlns:p14="http://schemas.microsoft.com/office/powerpoint/2010/main" val="2249661415"/>
       </p:ext>
     </p:extLst>
   </p:cSld>
@@ -5318,36 +5393,72 @@
           <a:lstStyle/>
           <a:p>
             <a:r>
+              <a:rPr lang="en-US" dirty="0" err="1"/>
+              <a:t>GiT</a:t>
+            </a:r>
+            <a:r>
+              <a:rPr lang="en-US" dirty="0"/>
+              <a:t> – Basic Commands</a:t>
+            </a:r>
+          </a:p>
+        </p:txBody>
+      </p:sp>
+      <p:sp>
+        <p:nvSpPr>
+          <p:cNvPr id="3" name="Content Placeholder 2"/>
+          <p:cNvSpPr>
+            <a:spLocks noGrp="1"/>
+          </p:cNvSpPr>
+          <p:nvPr>
+            <p:ph idx="1"/>
+          </p:nvPr>
+        </p:nvSpPr>
+        <p:spPr/>
+        <p:txBody>
+          <a:bodyPr/>
+          <a:lstStyle/>
+          <a:p>
+            <a:r>
               <a:rPr lang="en-US" dirty="0" err="1" smtClean="0"/>
-              <a:t>Git</a:t>
-            </a:r>
-            <a:endParaRPr lang="en-US" dirty="0"/>
-          </a:p>
-        </p:txBody>
-      </p:sp>
-      <p:sp>
-        <p:nvSpPr>
-          <p:cNvPr id="3" name="Content Placeholder 2"/>
-          <p:cNvSpPr>
-            <a:spLocks noGrp="1"/>
-          </p:cNvSpPr>
-          <p:nvPr>
-            <p:ph idx="1"/>
-          </p:nvPr>
-        </p:nvSpPr>
-        <p:spPr/>
-        <p:txBody>
-          <a:bodyPr/>
-          <a:lstStyle/>
-          <a:p>
-            <a:endParaRPr lang="en-US" dirty="0"/>
+              <a:t>ls</a:t>
+            </a:r>
+            <a:r>
+              <a:rPr lang="en-US" dirty="0" smtClean="0"/>
+              <a:t> – shows you the directory you are currently working in</a:t>
+            </a:r>
+          </a:p>
+          <a:p>
+            <a:r>
+              <a:rPr lang="en-US" dirty="0" smtClean="0"/>
+              <a:t>cd </a:t>
+            </a:r>
+            <a:r>
+              <a:rPr lang="en-US" i="1" dirty="0" smtClean="0"/>
+              <a:t>filename</a:t>
+            </a:r>
+            <a:r>
+              <a:rPr lang="en-US" dirty="0" smtClean="0"/>
+              <a:t> – allows you to navigate to the selected file name</a:t>
+            </a:r>
+          </a:p>
+          <a:p>
+            <a:r>
+              <a:rPr lang="en-US" dirty="0" smtClean="0"/>
+              <a:t>cd .. – allows you to navigate the directory above where you currently are</a:t>
+            </a:r>
+          </a:p>
+          <a:p>
+            <a:r>
+              <a:rPr lang="en-US" dirty="0" smtClean="0"/>
+              <a:t>cd – allows you to go to root</a:t>
+            </a:r>
           </a:p>
         </p:txBody>
       </p:sp>
     </p:spTree>
     <p:extLst>
       <p:ext uri="{BB962C8B-B14F-4D97-AF65-F5344CB8AC3E}">
-        <p14:creationId xmlns:p14="http://schemas.microsoft.com/office/powerpoint/2010/main" val="1944261486"/>
+        <p14:creationId xmlns:p14="http://schemas.microsoft.com/office/powerpoint/2010/main" val="1792104884"/>
       </p:ext>
     </p:extLst>
   </p:cSld>
@@ -5394,8 +5505,12 @@
               <a:t>GiT</a:t>
             </a:r>
             <a:r>
+              <a:rPr lang="en-US" dirty="0"/>
+              <a:t> </a:t>
+            </a:r>
+            <a:r>
               <a:rPr lang="en-US" dirty="0" smtClean="0"/>
-              <a:t> - installation </a:t>
+              <a:t>– Basic Commands</a:t>
             </a:r>
             <a:endParaRPr lang="en-US" dirty="0"/>
           </a:p>
@@ -5417,49 +5532,40 @@
           <a:lstStyle/>
           <a:p>
             <a:r>
+              <a:rPr lang="en-US" dirty="0" err="1" smtClean="0"/>
+              <a:t>git</a:t>
+            </a:r>
+            <a:r>
               <a:rPr lang="en-US" dirty="0" smtClean="0"/>
-              <a:t>Installation of </a:t>
-            </a:r>
+              <a:t> status – Allows you to see the stage at what your repository is like compared to the shared repository.</a:t>
+            </a:r>
+          </a:p>
+          <a:p>
             <a:r>
               <a:rPr lang="en-US" dirty="0" err="1" smtClean="0"/>
-              <a:t>GiT</a:t>
+              <a:t>git</a:t>
             </a:r>
             <a:r>
               <a:rPr lang="en-US" dirty="0" smtClean="0"/>
-              <a:t> is quick and simple.</a:t>
-            </a:r>
-          </a:p>
-          <a:p>
+              <a:t> pull – pulls the shared repository from </a:t>
+            </a:r>
+            <a:r>
+              <a:rPr lang="en-US" dirty="0" err="1" smtClean="0"/>
+              <a:t>GiThub</a:t>
+            </a:r>
             <a:r>
               <a:rPr lang="en-US" dirty="0" smtClean="0"/>
-              <a:t>Click on the link below</a:t>
-            </a:r>
-          </a:p>
-          <a:p>
-            <a:r>
-              <a:rPr lang="en-US" dirty="0" smtClean="0">
-                <a:hlinkClick r:id="rId2"/>
-              </a:rPr>
-              <a:t>https</a:t>
-            </a:r>
-            <a:r>
-              <a:rPr lang="en-US" dirty="0">
-                <a:hlinkClick r:id="rId2"/>
-              </a:rPr>
-              <a:t>://github.com/git-for-windows/git/releases/download/v2.5.1.windows.1/Git-2.5.1-64-</a:t>
-            </a:r>
-            <a:r>
-              <a:rPr lang="en-US" dirty="0" smtClean="0">
-                <a:hlinkClick r:id="rId2"/>
-              </a:rPr>
-              <a:t>bit.exe</a:t>
-            </a:r>
-            <a:endParaRPr lang="en-US" dirty="0" smtClean="0"/>
-          </a:p>
-          <a:p>
+              <a:t> and updates your local repository.</a:t>
+            </a:r>
+          </a:p>
+          <a:p>
+            <a:r>
+              <a:rPr lang="en-US" dirty="0" err="1" smtClean="0"/>
+              <a:t>git</a:t>
+            </a:r>
             <a:r>
               <a:rPr lang="en-US" dirty="0" smtClean="0"/>
-              <a:t>Launch the exe file, and install.</a:t>
+              <a:t> commit –m “insert message here” – this command snapshots the changes you want to make</a:t>
             </a:r>
             <a:endParaRPr lang="en-US" dirty="0"/>
           </a:p>
@@ -5468,7 +5574,7 @@
     </p:spTree>
     <p:extLst>
       <p:ext uri="{BB962C8B-B14F-4D97-AF65-F5344CB8AC3E}">
-        <p14:creationId xmlns:p14="http://schemas.microsoft.com/office/powerpoint/2010/main" val="2249661415"/>
+        <p14:creationId xmlns:p14="http://schemas.microsoft.com/office/powerpoint/2010/main" val="703725838"/>
       </p:ext>
     </p:extLst>
   </p:cSld>
@@ -5538,45 +5644,47 @@
           <a:p>
             <a:r>
               <a:rPr lang="en-US" dirty="0" err="1" smtClean="0"/>
-              <a:t>ls</a:t>
+              <a:t>git</a:t>
             </a:r>
             <a:r>
               <a:rPr lang="en-US" dirty="0" smtClean="0"/>
-              <a:t> – shows you the directory you are currently working in</a:t>
-            </a:r>
-          </a:p>
-          <a:p>
+              <a:t> add </a:t>
+            </a:r>
+            <a:r>
+              <a:rPr lang="en-US" i="1" dirty="0" smtClean="0"/>
+              <a:t>filename </a:t>
+            </a:r>
             <a:r>
               <a:rPr lang="en-US" dirty="0" smtClean="0"/>
-              <a:t>cd </a:t>
-            </a:r>
-            <a:r>
-              <a:rPr lang="en-US" i="1" dirty="0" smtClean="0"/>
-              <a:t>filename</a:t>
+              <a:t>– takes a snapshot of the file</a:t>
+            </a:r>
+          </a:p>
+          <a:p>
+            <a:r>
+              <a:rPr lang="en-US" dirty="0" err="1" smtClean="0"/>
+              <a:t>git</a:t>
             </a:r>
             <a:r>
               <a:rPr lang="en-US" dirty="0" smtClean="0"/>
-              <a:t> – allows you to navigate to the selected file name</a:t>
-            </a:r>
-          </a:p>
-          <a:p>
+              <a:t> push – pushes the snapshots you have taken to the shared repository</a:t>
+            </a:r>
+          </a:p>
+          <a:p>
+            <a:pPr marL="0" indent="0" algn="ctr">
+              <a:buNone/>
+            </a:pPr>
             <a:r>
               <a:rPr lang="en-US" dirty="0" smtClean="0"/>
-              <a:t>cd .. – allows you to navigate the directory above where you currently are</a:t>
-            </a:r>
-          </a:p>
-          <a:p>
-            <a:r>
-              <a:rPr lang="en-US" dirty="0" smtClean="0"/>
-              <a:t>cd – allows you to go to root</a:t>
-            </a:r>
+              <a:t>WARNING – PUSHING CAN CAUSE CONFLICTS</a:t>
+            </a:r>
+            <a:endParaRPr lang="en-US" dirty="0"/>
           </a:p>
         </p:txBody>
       </p:sp>
     </p:spTree>
     <p:extLst>
       <p:ext uri="{BB962C8B-B14F-4D97-AF65-F5344CB8AC3E}">
-        <p14:creationId xmlns:p14="http://schemas.microsoft.com/office/powerpoint/2010/main" val="1792104884"/>
+        <p14:creationId xmlns:p14="http://schemas.microsoft.com/office/powerpoint/2010/main" val="263441724"/>
       </p:ext>
     </p:extLst>
   </p:cSld>
@@ -5623,67 +5731,79 @@
               <a:t>GiT</a:t>
             </a:r>
             <a:r>
+              <a:rPr lang="en-US" dirty="0" smtClean="0"/>
+              <a:t> </a:t>
+            </a:r>
+            <a:r>
+              <a:rPr lang="en-US" dirty="0" smtClean="0"/>
+              <a:t>– </a:t>
+            </a:r>
+            <a:r>
+              <a:rPr lang="en-US" dirty="0" smtClean="0"/>
+              <a:t>Ignoring files</a:t>
+            </a:r>
+            <a:endParaRPr lang="en-US" dirty="0"/>
+          </a:p>
+        </p:txBody>
+      </p:sp>
+      <p:sp>
+        <p:nvSpPr>
+          <p:cNvPr id="3" name="Content Placeholder 2"/>
+          <p:cNvSpPr>
+            <a:spLocks noGrp="1"/>
+          </p:cNvSpPr>
+          <p:nvPr>
+            <p:ph idx="1"/>
+          </p:nvPr>
+        </p:nvSpPr>
+        <p:spPr/>
+        <p:txBody>
+          <a:bodyPr/>
+          <a:lstStyle/>
+          <a:p>
+            <a:r>
+              <a:rPr lang="en-US" dirty="0" smtClean="0"/>
+              <a:t> Sometimes there are files that we don’t want to push into the repository because they are local to a machine and won’t work on another one</a:t>
+            </a:r>
+          </a:p>
+          <a:p>
+            <a:r>
               <a:rPr lang="en-US" dirty="0"/>
               <a:t> </a:t>
             </a:r>
             <a:r>
               <a:rPr lang="en-US" dirty="0" smtClean="0"/>
-              <a:t>– Basic Commands</a:t>
-            </a:r>
-            <a:endParaRPr lang="en-US" dirty="0"/>
-          </a:p>
-        </p:txBody>
-      </p:sp>
-      <p:sp>
-        <p:nvSpPr>
-          <p:cNvPr id="3" name="Content Placeholder 2"/>
-          <p:cNvSpPr>
-            <a:spLocks noGrp="1"/>
-          </p:cNvSpPr>
-          <p:nvPr>
-            <p:ph idx="1"/>
-          </p:nvPr>
-        </p:nvSpPr>
-        <p:spPr/>
-        <p:txBody>
-          <a:bodyPr/>
-          <a:lstStyle/>
-          <a:p>
+              <a:t>To do this we use a text file called .</a:t>
+            </a:r>
             <a:r>
               <a:rPr lang="en-US" dirty="0" err="1" smtClean="0"/>
-              <a:t>git</a:t>
+              <a:t>gitignore</a:t>
             </a:r>
             <a:r>
               <a:rPr lang="en-US" dirty="0" smtClean="0"/>
-              <a:t> status – Allows you to see the stage at what your repository is like compared to the shared repository.</a:t>
-            </a:r>
-          </a:p>
-          <a:p>
+              <a:t> which will tell </a:t>
+            </a:r>
             <a:r>
               <a:rPr lang="en-US" dirty="0" err="1" smtClean="0"/>
-              <a:t>git</a:t>
+              <a:t>Git</a:t>
             </a:r>
             <a:r>
               <a:rPr lang="en-US" dirty="0" smtClean="0"/>
-              <a:t> pull – pulls the shared repository from </a:t>
+              <a:t> to not track any changes to it</a:t>
+            </a:r>
+          </a:p>
+          <a:p>
+            <a:r>
+              <a:rPr lang="en-US" dirty="0"/>
+              <a:t> </a:t>
+            </a:r>
+            <a:r>
+              <a:rPr lang="en-US" dirty="0" smtClean="0"/>
+              <a:t>For example: /.</a:t>
             </a:r>
             <a:r>
               <a:rPr lang="en-US" dirty="0" err="1" smtClean="0"/>
-              <a:t>GiThub</a:t>
-            </a:r>
-            <a:r>
-              <a:rPr lang="en-US" dirty="0" smtClean="0"/>
-              <a:t> and updates your local repository.</a:t>
-            </a:r>
-          </a:p>
-          <a:p>
-            <a:r>
-              <a:rPr lang="en-US" dirty="0" err="1" smtClean="0"/>
-              <a:t>git</a:t>
-            </a:r>
-            <a:r>
-              <a:rPr lang="en-US" dirty="0" smtClean="0"/>
-              <a:t> commit –m “insert message here” – this command snapshots the changes you want to make</a:t>
+              <a:t>classpath</a:t>
             </a:r>
             <a:endParaRPr lang="en-US" dirty="0"/>
           </a:p>
@@ -5692,7 +5812,7 @@
     </p:spTree>
     <p:extLst>
       <p:ext uri="{BB962C8B-B14F-4D97-AF65-F5344CB8AC3E}">
-        <p14:creationId xmlns:p14="http://schemas.microsoft.com/office/powerpoint/2010/main" val="703725838"/>
+        <p14:creationId xmlns:p14="http://schemas.microsoft.com/office/powerpoint/2010/main" val="2120541633"/>
       </p:ext>
     </p:extLst>
   </p:cSld>
@@ -5735,65 +5855,65 @@
           <a:lstStyle/>
           <a:p>
             <a:r>
-              <a:rPr lang="en-US" dirty="0" err="1"/>
+              <a:rPr lang="en-US" dirty="0" err="1" smtClean="0"/>
               <a:t>GiT</a:t>
             </a:r>
             <a:r>
+              <a:rPr lang="en-US" dirty="0" smtClean="0"/>
+              <a:t> – Merge Conflicts</a:t>
+            </a:r>
+            <a:endParaRPr lang="en-US" dirty="0"/>
+          </a:p>
+        </p:txBody>
+      </p:sp>
+      <p:sp>
+        <p:nvSpPr>
+          <p:cNvPr id="3" name="Content Placeholder 2"/>
+          <p:cNvSpPr>
+            <a:spLocks noGrp="1"/>
+          </p:cNvSpPr>
+          <p:nvPr>
+            <p:ph idx="1"/>
+          </p:nvPr>
+        </p:nvSpPr>
+        <p:spPr/>
+        <p:txBody>
+          <a:bodyPr/>
+          <a:lstStyle/>
+          <a:p>
+            <a:r>
               <a:rPr lang="en-US" dirty="0"/>
-              <a:t> – Basic Commands</a:t>
-            </a:r>
-          </a:p>
-        </p:txBody>
-      </p:sp>
-      <p:sp>
-        <p:nvSpPr>
-          <p:cNvPr id="3" name="Content Placeholder 2"/>
-          <p:cNvSpPr>
-            <a:spLocks noGrp="1"/>
-          </p:cNvSpPr>
-          <p:nvPr>
-            <p:ph idx="1"/>
-          </p:nvPr>
-        </p:nvSpPr>
-        <p:spPr/>
-        <p:txBody>
-          <a:bodyPr/>
-          <a:lstStyle/>
-          <a:p>
+              <a:t> </a:t>
+            </a:r>
+            <a:r>
+              <a:rPr lang="en-US" dirty="0" smtClean="0"/>
+              <a:t>When you push your changes, </a:t>
+            </a:r>
             <a:r>
               <a:rPr lang="en-US" dirty="0" err="1" smtClean="0"/>
-              <a:t>git</a:t>
+              <a:t>Git</a:t>
             </a:r>
             <a:r>
               <a:rPr lang="en-US" dirty="0" smtClean="0"/>
-              <a:t> add </a:t>
-            </a:r>
-            <a:r>
-              <a:rPr lang="en-US" i="1" dirty="0" smtClean="0"/>
-              <a:t>filename </a:t>
+              <a:t> merges your new additions with the repository, overwriting the old code with the new.</a:t>
+            </a:r>
+          </a:p>
+          <a:p>
+            <a:r>
+              <a:rPr lang="en-US" dirty="0"/>
+              <a:t> </a:t>
             </a:r>
             <a:r>
               <a:rPr lang="en-US" dirty="0" smtClean="0"/>
-              <a:t>– takes a snapshot of the file</a:t>
-            </a:r>
-          </a:p>
-          <a:p>
+              <a:t>When more than one person has altered the same piece of code and push their respective work. </a:t>
+            </a:r>
             <a:r>
               <a:rPr lang="en-US" dirty="0" err="1" smtClean="0"/>
-              <a:t>git</a:t>
+              <a:t>Git</a:t>
             </a:r>
             <a:r>
               <a:rPr lang="en-US" dirty="0" smtClean="0"/>
-              <a:t> push – pushes the snapshots you have taken to the shared repository</a:t>
-            </a:r>
-          </a:p>
-          <a:p>
-            <a:pPr marL="0" indent="0" algn="ctr">
-              <a:buNone/>
-            </a:pPr>
-            <a:r>
-              <a:rPr lang="en-US" dirty="0" smtClean="0"/>
-              <a:t>WARNING – PUSHING CAN CAUSE CONFLICTS</a:t>
+              <a:t> won’t know which one to use, causing a merge conflict.</a:t>
             </a:r>
             <a:endParaRPr lang="en-US" dirty="0"/>
           </a:p>
@@ -5802,7 +5922,233 @@
     </p:spTree>
     <p:extLst>
       <p:ext uri="{BB962C8B-B14F-4D97-AF65-F5344CB8AC3E}">
-        <p14:creationId xmlns:p14="http://schemas.microsoft.com/office/powerpoint/2010/main" val="263441724"/>
+        <p14:creationId xmlns:p14="http://schemas.microsoft.com/office/powerpoint/2010/main" val="3471873061"/>
+      </p:ext>
+    </p:extLst>
+  </p:cSld>
+  <p:clrMapOvr>
+    <a:masterClrMapping/>
+  </p:clrMapOvr>
+</p:sld>
+</file>
+
+<file path=ppt/slides/slide8.xml><?xml version="1.0" encoding="utf-8"?>
+<p:sld xmlns:a="http://schemas.openxmlformats.org/drawingml/2006/main" xmlns:r="http://schemas.openxmlformats.org/officeDocument/2006/relationships" xmlns:p="http://schemas.openxmlformats.org/presentationml/2006/main">
+  <p:cSld>
+    <p:spTree>
+      <p:nvGrpSpPr>
+        <p:cNvPr id="1" name=""/>
+        <p:cNvGrpSpPr/>
+        <p:nvPr/>
+      </p:nvGrpSpPr>
+      <p:grpSpPr>
+        <a:xfrm>
+          <a:off x="0" y="0"/>
+          <a:ext cx="0" cy="0"/>
+          <a:chOff x="0" y="0"/>
+          <a:chExt cx="0" cy="0"/>
+        </a:xfrm>
+      </p:grpSpPr>
+      <p:sp>
+        <p:nvSpPr>
+          <p:cNvPr id="2" name="Title 1"/>
+          <p:cNvSpPr>
+            <a:spLocks noGrp="1"/>
+          </p:cNvSpPr>
+          <p:nvPr>
+            <p:ph type="title"/>
+          </p:nvPr>
+        </p:nvSpPr>
+        <p:spPr/>
+        <p:txBody>
+          <a:bodyPr/>
+          <a:lstStyle/>
+          <a:p>
+            <a:r>
+              <a:rPr lang="en-US" dirty="0" err="1" smtClean="0"/>
+              <a:t>GiT</a:t>
+            </a:r>
+            <a:r>
+              <a:rPr lang="en-US" dirty="0" smtClean="0"/>
+              <a:t> – Merge Conflicts</a:t>
+            </a:r>
+            <a:endParaRPr lang="en-US" dirty="0"/>
+          </a:p>
+        </p:txBody>
+      </p:sp>
+      <p:sp>
+        <p:nvSpPr>
+          <p:cNvPr id="3" name="Content Placeholder 2"/>
+          <p:cNvSpPr>
+            <a:spLocks noGrp="1"/>
+          </p:cNvSpPr>
+          <p:nvPr>
+            <p:ph idx="1"/>
+          </p:nvPr>
+        </p:nvSpPr>
+        <p:spPr/>
+        <p:txBody>
+          <a:bodyPr/>
+          <a:lstStyle/>
+          <a:p>
+            <a:r>
+              <a:rPr lang="en-US" dirty="0"/>
+              <a:t> </a:t>
+            </a:r>
+            <a:r>
+              <a:rPr lang="en-US" dirty="0" smtClean="0"/>
+              <a:t>When a merge conflict happens, errors will appear in your code as </a:t>
+            </a:r>
+            <a:r>
+              <a:rPr lang="en-US" dirty="0" err="1" smtClean="0"/>
+              <a:t>Git</a:t>
+            </a:r>
+            <a:r>
+              <a:rPr lang="en-US" dirty="0" smtClean="0"/>
+              <a:t> will put all the conflicting pieces of code one after another and leave it to you to sort things out.</a:t>
+            </a:r>
+          </a:p>
+          <a:p>
+            <a:r>
+              <a:rPr lang="en-US" dirty="0"/>
+              <a:t> </a:t>
+            </a:r>
+            <a:r>
+              <a:rPr lang="en-US" dirty="0" smtClean="0"/>
+              <a:t>You need to decide which piece/s of code to use and delete the others, then commit and push to fix </a:t>
+            </a:r>
+            <a:r>
+              <a:rPr lang="en-US" smtClean="0"/>
+              <a:t>the conflict.</a:t>
+            </a:r>
+            <a:endParaRPr lang="en-US" dirty="0"/>
+          </a:p>
+        </p:txBody>
+      </p:sp>
+    </p:spTree>
+    <p:extLst>
+      <p:ext uri="{BB962C8B-B14F-4D97-AF65-F5344CB8AC3E}">
+        <p14:creationId xmlns:p14="http://schemas.microsoft.com/office/powerpoint/2010/main" val="1131235229"/>
+      </p:ext>
+    </p:extLst>
+  </p:cSld>
+  <p:clrMapOvr>
+    <a:masterClrMapping/>
+  </p:clrMapOvr>
+</p:sld>
+</file>
+
+<file path=ppt/slides/slide9.xml><?xml version="1.0" encoding="utf-8"?>
+<p:sld xmlns:a="http://schemas.openxmlformats.org/drawingml/2006/main" xmlns:r="http://schemas.openxmlformats.org/officeDocument/2006/relationships" xmlns:p="http://schemas.openxmlformats.org/presentationml/2006/main">
+  <p:cSld>
+    <p:spTree>
+      <p:nvGrpSpPr>
+        <p:cNvPr id="1" name=""/>
+        <p:cNvGrpSpPr/>
+        <p:nvPr/>
+      </p:nvGrpSpPr>
+      <p:grpSpPr>
+        <a:xfrm>
+          <a:off x="0" y="0"/>
+          <a:ext cx="0" cy="0"/>
+          <a:chOff x="0" y="0"/>
+          <a:chExt cx="0" cy="0"/>
+        </a:xfrm>
+      </p:grpSpPr>
+      <p:sp>
+        <p:nvSpPr>
+          <p:cNvPr id="2" name="Title 1"/>
+          <p:cNvSpPr>
+            <a:spLocks noGrp="1"/>
+          </p:cNvSpPr>
+          <p:nvPr>
+            <p:ph type="title"/>
+          </p:nvPr>
+        </p:nvSpPr>
+        <p:spPr/>
+        <p:txBody>
+          <a:bodyPr/>
+          <a:lstStyle/>
+          <a:p>
+            <a:r>
+              <a:rPr lang="en-US" dirty="0" smtClean="0"/>
+              <a:t>Rules of </a:t>
+            </a:r>
+            <a:r>
+              <a:rPr lang="en-US" dirty="0" err="1" smtClean="0"/>
+              <a:t>Git</a:t>
+            </a:r>
+            <a:endParaRPr lang="en-US" dirty="0"/>
+          </a:p>
+        </p:txBody>
+      </p:sp>
+      <p:sp>
+        <p:nvSpPr>
+          <p:cNvPr id="3" name="Content Placeholder 2"/>
+          <p:cNvSpPr>
+            <a:spLocks noGrp="1"/>
+          </p:cNvSpPr>
+          <p:nvPr>
+            <p:ph idx="1"/>
+          </p:nvPr>
+        </p:nvSpPr>
+        <p:spPr/>
+        <p:txBody>
+          <a:bodyPr/>
+          <a:lstStyle/>
+          <a:p>
+            <a:r>
+              <a:rPr lang="en-US" dirty="0" smtClean="0"/>
+              <a:t> Write useful commit messages</a:t>
+            </a:r>
+          </a:p>
+          <a:p>
+            <a:r>
+              <a:rPr lang="en-US" dirty="0"/>
+              <a:t> </a:t>
+            </a:r>
+            <a:r>
+              <a:rPr lang="en-US" dirty="0" smtClean="0"/>
+              <a:t>Always pull before you push – it won’t let you anyway</a:t>
+            </a:r>
+          </a:p>
+          <a:p>
+            <a:r>
+              <a:rPr lang="en-US" dirty="0"/>
+              <a:t> </a:t>
+            </a:r>
+            <a:r>
+              <a:rPr lang="en-US" dirty="0" smtClean="0"/>
+              <a:t>Re – cloning is not a way of fixing merge conflicts</a:t>
+            </a:r>
+          </a:p>
+          <a:p>
+            <a:r>
+              <a:rPr lang="en-US" dirty="0"/>
+              <a:t> </a:t>
+            </a:r>
+            <a:r>
+              <a:rPr lang="en-US" dirty="0" smtClean="0"/>
+              <a:t>Do not commit broken code – test beforehand</a:t>
+            </a:r>
+          </a:p>
+          <a:p>
+            <a:r>
+              <a:rPr lang="en-US" dirty="0"/>
+              <a:t> </a:t>
+            </a:r>
+            <a:r>
+              <a:rPr lang="en-US" dirty="0" smtClean="0"/>
+              <a:t>Commit often, push once</a:t>
+            </a:r>
+            <a:endParaRPr lang="en-US" dirty="0"/>
+          </a:p>
+        </p:txBody>
+      </p:sp>
+    </p:spTree>
+    <p:extLst>
+      <p:ext uri="{BB962C8B-B14F-4D97-AF65-F5344CB8AC3E}">
+        <p14:creationId xmlns:p14="http://schemas.microsoft.com/office/powerpoint/2010/main" val="1303282329"/>
       </p:ext>
     </p:extLst>
   </p:cSld>

</xml_diff>

<commit_message>
added additional slides and reordered slides
</commit_message>
<xml_diff>
--- a/Git/Git Slides.pptx
+++ b/Git/Git Slides.pptx
@@ -9,12 +9,13 @@
     <p:sldId id="259" r:id="rId3"/>
     <p:sldId id="260" r:id="rId4"/>
     <p:sldId id="261" r:id="rId5"/>
-    <p:sldId id="262" r:id="rId6"/>
-    <p:sldId id="263" r:id="rId7"/>
-    <p:sldId id="264" r:id="rId8"/>
+    <p:sldId id="268" r:id="rId6"/>
+    <p:sldId id="269" r:id="rId7"/>
+    <p:sldId id="263" r:id="rId8"/>
     <p:sldId id="265" r:id="rId9"/>
-    <p:sldId id="266" r:id="rId10"/>
-    <p:sldId id="267" r:id="rId11"/>
+    <p:sldId id="264" r:id="rId10"/>
+    <p:sldId id="266" r:id="rId11"/>
+    <p:sldId id="267" r:id="rId12"/>
   </p:sldIdLst>
   <p:sldSz cx="9144000" cy="6858000" type="screen4x3"/>
   <p:notesSz cx="6858000" cy="9144000"/>
@@ -5169,6 +5170,126 @@
           <a:p>
             <a:r>
               <a:rPr lang="en-US" dirty="0" smtClean="0"/>
+              <a:t>Rules of </a:t>
+            </a:r>
+            <a:r>
+              <a:rPr lang="en-US" dirty="0" err="1" smtClean="0"/>
+              <a:t>Git</a:t>
+            </a:r>
+            <a:endParaRPr lang="en-US" dirty="0"/>
+          </a:p>
+        </p:txBody>
+      </p:sp>
+      <p:sp>
+        <p:nvSpPr>
+          <p:cNvPr id="3" name="Content Placeholder 2"/>
+          <p:cNvSpPr>
+            <a:spLocks noGrp="1"/>
+          </p:cNvSpPr>
+          <p:nvPr>
+            <p:ph idx="1"/>
+          </p:nvPr>
+        </p:nvSpPr>
+        <p:spPr/>
+        <p:txBody>
+          <a:bodyPr/>
+          <a:lstStyle/>
+          <a:p>
+            <a:r>
+              <a:rPr lang="en-US" dirty="0" smtClean="0"/>
+              <a:t> Write useful commit messages</a:t>
+            </a:r>
+          </a:p>
+          <a:p>
+            <a:r>
+              <a:rPr lang="en-US" dirty="0"/>
+              <a:t> </a:t>
+            </a:r>
+            <a:r>
+              <a:rPr lang="en-US" dirty="0" smtClean="0"/>
+              <a:t>Always pull before you push – it won’t let you anyway</a:t>
+            </a:r>
+          </a:p>
+          <a:p>
+            <a:r>
+              <a:rPr lang="en-US" dirty="0"/>
+              <a:t> </a:t>
+            </a:r>
+            <a:r>
+              <a:rPr lang="en-US" dirty="0" smtClean="0"/>
+              <a:t>Re – cloning is not a way of fixing merge conflicts</a:t>
+            </a:r>
+          </a:p>
+          <a:p>
+            <a:r>
+              <a:rPr lang="en-US" dirty="0"/>
+              <a:t> </a:t>
+            </a:r>
+            <a:r>
+              <a:rPr lang="en-US" dirty="0" smtClean="0"/>
+              <a:t>Do not commit broken code – test beforehand</a:t>
+            </a:r>
+          </a:p>
+          <a:p>
+            <a:r>
+              <a:rPr lang="en-US" dirty="0"/>
+              <a:t> </a:t>
+            </a:r>
+            <a:r>
+              <a:rPr lang="en-US" dirty="0" smtClean="0"/>
+              <a:t>Commit often, push once</a:t>
+            </a:r>
+            <a:endParaRPr lang="en-US" dirty="0"/>
+          </a:p>
+        </p:txBody>
+      </p:sp>
+    </p:spTree>
+    <p:extLst>
+      <p:ext uri="{BB962C8B-B14F-4D97-AF65-F5344CB8AC3E}">
+        <p14:creationId xmlns:p14="http://schemas.microsoft.com/office/powerpoint/2010/main" val="1303282329"/>
+      </p:ext>
+    </p:extLst>
+  </p:cSld>
+  <p:clrMapOvr>
+    <a:masterClrMapping/>
+  </p:clrMapOvr>
+</p:sld>
+</file>
+
+<file path=ppt/slides/slide11.xml><?xml version="1.0" encoding="utf-8"?>
+<p:sld xmlns:a="http://schemas.openxmlformats.org/drawingml/2006/main" xmlns:r="http://schemas.openxmlformats.org/officeDocument/2006/relationships" xmlns:p="http://schemas.openxmlformats.org/presentationml/2006/main">
+  <p:cSld>
+    <p:spTree>
+      <p:nvGrpSpPr>
+        <p:cNvPr id="1" name=""/>
+        <p:cNvGrpSpPr/>
+        <p:nvPr/>
+      </p:nvGrpSpPr>
+      <p:grpSpPr>
+        <a:xfrm>
+          <a:off x="0" y="0"/>
+          <a:ext cx="0" cy="0"/>
+          <a:chOff x="0" y="0"/>
+          <a:chExt cx="0" cy="0"/>
+        </a:xfrm>
+      </p:grpSpPr>
+      <p:sp>
+        <p:nvSpPr>
+          <p:cNvPr id="2" name="Title 1"/>
+          <p:cNvSpPr>
+            <a:spLocks noGrp="1"/>
+          </p:cNvSpPr>
+          <p:nvPr>
+            <p:ph type="title"/>
+          </p:nvPr>
+        </p:nvSpPr>
+        <p:spPr/>
+        <p:txBody>
+          <a:bodyPr/>
+          <a:lstStyle/>
+          <a:p>
+            <a:r>
+              <a:rPr lang="en-US" dirty="0" smtClean="0"/>
               <a:t>More Rules of </a:t>
             </a:r>
             <a:r>
@@ -5617,12 +5738,8 @@
           <a:lstStyle/>
           <a:p>
             <a:r>
-              <a:rPr lang="en-US" dirty="0" err="1"/>
-              <a:t>GiT</a:t>
-            </a:r>
-            <a:r>
               <a:rPr lang="en-US" dirty="0"/>
-              <a:t> – Basic Commands</a:t>
+              <a:t>GiT – Basic Commands</a:t>
             </a:r>
           </a:p>
         </p:txBody>
@@ -5643,12 +5760,8 @@
           <a:lstStyle/>
           <a:p>
             <a:r>
-              <a:rPr lang="en-US" dirty="0" err="1" smtClean="0"/>
-              <a:t>git</a:t>
-            </a:r>
-            <a:r>
               <a:rPr lang="en-US" dirty="0" smtClean="0"/>
-              <a:t> add </a:t>
+              <a:t>git add </a:t>
             </a:r>
             <a:r>
               <a:rPr lang="en-US" i="1" dirty="0" smtClean="0"/>
@@ -5661,13 +5774,37 @@
           </a:p>
           <a:p>
             <a:r>
-              <a:rPr lang="en-US" dirty="0" err="1" smtClean="0"/>
-              <a:t>git</a:t>
-            </a:r>
-            <a:r>
               <a:rPr lang="en-US" dirty="0" smtClean="0"/>
-              <a:t> push – pushes the snapshots you have taken to the shared repository</a:t>
-            </a:r>
+              <a:t>git push – pushes the snapshots you have taken to the shared </a:t>
+            </a:r>
+            <a:r>
+              <a:rPr lang="en-US" dirty="0" smtClean="0"/>
+              <a:t>repository</a:t>
+            </a:r>
+          </a:p>
+          <a:p>
+            <a:r>
+              <a:rPr lang="en-US" dirty="0" smtClean="0"/>
+              <a:t>git reset &lt;</a:t>
+            </a:r>
+            <a:r>
+              <a:rPr lang="en-US" i="1" dirty="0" smtClean="0"/>
+              <a:t>filename</a:t>
+            </a:r>
+            <a:r>
+              <a:rPr lang="en-US" dirty="0" smtClean="0"/>
+              <a:t>&gt; - this will undo the addition of a file in git add</a:t>
+            </a:r>
+          </a:p>
+          <a:p>
+            <a:pPr marL="0" indent="0">
+              <a:buNone/>
+            </a:pPr>
+            <a:r>
+              <a:rPr lang="en-US" dirty="0" smtClean="0"/>
+              <a:t> </a:t>
+            </a:r>
+            <a:endParaRPr lang="en-US" dirty="0" smtClean="0"/>
           </a:p>
           <a:p>
             <a:pPr marL="0" indent="0" algn="ctr">
@@ -5684,7 +5821,7 @@
     </p:spTree>
     <p:extLst>
       <p:ext uri="{BB962C8B-B14F-4D97-AF65-F5344CB8AC3E}">
-        <p14:creationId xmlns:p14="http://schemas.microsoft.com/office/powerpoint/2010/main" val="263441724"/>
+        <p14:creationId xmlns:p14="http://schemas.microsoft.com/office/powerpoint/2010/main" val="2521920949"/>
       </p:ext>
     </p:extLst>
   </p:cSld>
@@ -5727,83 +5864,74 @@
           <a:lstStyle/>
           <a:p>
             <a:r>
-              <a:rPr lang="en-US" dirty="0" err="1" smtClean="0"/>
-              <a:t>GiT</a:t>
-            </a:r>
-            <a:r>
               <a:rPr lang="en-US" dirty="0" smtClean="0"/>
-              <a:t> </a:t>
-            </a:r>
+              <a:t>GiT – Moving Files</a:t>
+            </a:r>
+            <a:endParaRPr lang="en-US" dirty="0"/>
+          </a:p>
+        </p:txBody>
+      </p:sp>
+      <p:sp>
+        <p:nvSpPr>
+          <p:cNvPr id="3" name="Content Placeholder 2"/>
+          <p:cNvSpPr>
+            <a:spLocks noGrp="1"/>
+          </p:cNvSpPr>
+          <p:nvPr>
+            <p:ph idx="1"/>
+          </p:nvPr>
+        </p:nvSpPr>
+        <p:spPr/>
+        <p:txBody>
+          <a:bodyPr/>
+          <a:lstStyle/>
+          <a:p>
             <a:r>
               <a:rPr lang="en-US" dirty="0" smtClean="0"/>
-              <a:t>– </a:t>
-            </a:r>
+              <a:t>In order to move a file, you need to know two things, firstly where the file is stored, and secondly where it will be moved to.</a:t>
+            </a:r>
+          </a:p>
+          <a:p>
+            <a:endParaRPr lang="en-US" dirty="0"/>
+          </a:p>
+          <a:p>
             <a:r>
               <a:rPr lang="en-US" dirty="0" smtClean="0"/>
-              <a:t>Ignoring files</a:t>
-            </a:r>
-            <a:endParaRPr lang="en-US" dirty="0"/>
-          </a:p>
-        </p:txBody>
-      </p:sp>
-      <p:sp>
-        <p:nvSpPr>
-          <p:cNvPr id="3" name="Content Placeholder 2"/>
-          <p:cNvSpPr>
-            <a:spLocks noGrp="1"/>
-          </p:cNvSpPr>
-          <p:nvPr>
-            <p:ph idx="1"/>
-          </p:nvPr>
-        </p:nvSpPr>
-        <p:spPr/>
-        <p:txBody>
-          <a:bodyPr/>
-          <a:lstStyle/>
-          <a:p>
+              <a:t>Example</a:t>
+            </a:r>
+          </a:p>
+          <a:p>
+            <a:pPr marL="0" indent="0">
+              <a:buNone/>
+            </a:pPr>
             <a:r>
               <a:rPr lang="en-US" dirty="0" smtClean="0"/>
-              <a:t> Sometimes there are files that we don’t want to push into the repository because they are local to a machine and won’t work on another one</a:t>
-            </a:r>
-          </a:p>
-          <a:p>
-            <a:r>
-              <a:rPr lang="en-US" dirty="0"/>
-              <a:t> </a:t>
+              <a:t>git mv </a:t>
+            </a:r>
+            <a:r>
+              <a:rPr lang="en-US" i="1" dirty="0" smtClean="0"/>
+              <a:t>filename</a:t>
             </a:r>
             <a:r>
               <a:rPr lang="en-US" dirty="0" smtClean="0"/>
-              <a:t>To do this we use a text file called .</a:t>
-            </a:r>
-            <a:r>
-              <a:rPr lang="en-US" dirty="0" err="1" smtClean="0"/>
-              <a:t>gitignore</a:t>
+              <a:t>/ </a:t>
+            </a:r>
+            <a:r>
+              <a:rPr lang="en-US" i="1" dirty="0" err="1" smtClean="0"/>
+              <a:t>filelocation</a:t>
             </a:r>
             <a:r>
               <a:rPr lang="en-US" dirty="0" smtClean="0"/>
-              <a:t> which will tell </a:t>
-            </a:r>
-            <a:r>
-              <a:rPr lang="en-US" dirty="0" err="1" smtClean="0"/>
-              <a:t>Git</a:t>
-            </a:r>
+              <a:t>/</a:t>
+            </a:r>
+          </a:p>
+          <a:p>
+            <a:pPr marL="0" indent="0">
+              <a:buNone/>
+            </a:pPr>
             <a:r>
               <a:rPr lang="en-US" dirty="0" smtClean="0"/>
-              <a:t> to not track any changes to it</a:t>
-            </a:r>
-          </a:p>
-          <a:p>
-            <a:r>
-              <a:rPr lang="en-US" dirty="0"/>
-              <a:t> </a:t>
-            </a:r>
-            <a:r>
-              <a:rPr lang="en-US" dirty="0" smtClean="0"/>
-              <a:t>For example: /.</a:t>
-            </a:r>
-            <a:r>
-              <a:rPr lang="en-US" dirty="0" err="1" smtClean="0"/>
-              <a:t>classpath</a:t>
+              <a:t>Bare in mind that locations need to be from the current position.</a:t>
             </a:r>
             <a:endParaRPr lang="en-US" dirty="0"/>
           </a:p>
@@ -5812,7 +5940,7 @@
     </p:spTree>
     <p:extLst>
       <p:ext uri="{BB962C8B-B14F-4D97-AF65-F5344CB8AC3E}">
-        <p14:creationId xmlns:p14="http://schemas.microsoft.com/office/powerpoint/2010/main" val="2120541633"/>
+        <p14:creationId xmlns:p14="http://schemas.microsoft.com/office/powerpoint/2010/main" val="2377539948"/>
       </p:ext>
     </p:extLst>
   </p:cSld>
@@ -5860,7 +5988,7 @@
             </a:r>
             <a:r>
               <a:rPr lang="en-US" dirty="0" smtClean="0"/>
-              <a:t> – Merge Conflicts</a:t>
+              <a:t> – Ignoring files</a:t>
             </a:r>
             <a:endParaRPr lang="en-US" dirty="0"/>
           </a:p>
@@ -5880,6 +6008,12 @@
         <p:txBody>
           <a:bodyPr/>
           <a:lstStyle/>
+          <a:p>
+            <a:r>
+              <a:rPr lang="en-US" dirty="0" smtClean="0"/>
+              <a:t> Sometimes there are files that we don’t want to push into the repository because they are local to a machine and won’t work on another one</a:t>
+            </a:r>
+          </a:p>
           <a:p>
             <a:r>
               <a:rPr lang="en-US" dirty="0"/>
@@ -5887,7 +6021,15 @@
             </a:r>
             <a:r>
               <a:rPr lang="en-US" dirty="0" smtClean="0"/>
-              <a:t>When you push your changes, </a:t>
+              <a:t>To do this we use a text file called .</a:t>
+            </a:r>
+            <a:r>
+              <a:rPr lang="en-US" dirty="0" err="1" smtClean="0"/>
+              <a:t>gitignore</a:t>
+            </a:r>
+            <a:r>
+              <a:rPr lang="en-US" dirty="0" smtClean="0"/>
+              <a:t> which will tell </a:t>
             </a:r>
             <a:r>
               <a:rPr lang="en-US" dirty="0" err="1" smtClean="0"/>
@@ -5895,7 +6037,7 @@
             </a:r>
             <a:r>
               <a:rPr lang="en-US" dirty="0" smtClean="0"/>
-              <a:t> merges your new additions with the repository, overwriting the old code with the new.</a:t>
+              <a:t> to not track any changes to it</a:t>
             </a:r>
           </a:p>
           <a:p>
@@ -5905,15 +6047,11 @@
             </a:r>
             <a:r>
               <a:rPr lang="en-US" dirty="0" smtClean="0"/>
-              <a:t>When more than one person has altered the same piece of code and push their respective work. </a:t>
+              <a:t>For example: /.</a:t>
             </a:r>
             <a:r>
               <a:rPr lang="en-US" dirty="0" err="1" smtClean="0"/>
-              <a:t>Git</a:t>
-            </a:r>
-            <a:r>
-              <a:rPr lang="en-US" dirty="0" smtClean="0"/>
-              <a:t> won’t know which one to use, causing a merge conflict.</a:t>
+              <a:t>classpath</a:t>
             </a:r>
             <a:endParaRPr lang="en-US" dirty="0"/>
           </a:p>
@@ -5922,7 +6060,7 @@
     </p:spTree>
     <p:extLst>
       <p:ext uri="{BB962C8B-B14F-4D97-AF65-F5344CB8AC3E}">
-        <p14:creationId xmlns:p14="http://schemas.microsoft.com/office/powerpoint/2010/main" val="3471873061"/>
+        <p14:creationId xmlns:p14="http://schemas.microsoft.com/office/powerpoint/2010/main" val="2120541633"/>
       </p:ext>
     </p:extLst>
   </p:cSld>
@@ -6071,35 +6209,47 @@
           <a:lstStyle/>
           <a:p>
             <a:r>
+              <a:rPr lang="en-US" dirty="0" err="1" smtClean="0"/>
+              <a:t>GiT</a:t>
+            </a:r>
+            <a:r>
               <a:rPr lang="en-US" dirty="0" smtClean="0"/>
-              <a:t>Rules of </a:t>
+              <a:t> – Merge Conflicts</a:t>
+            </a:r>
+            <a:endParaRPr lang="en-US" dirty="0"/>
+          </a:p>
+        </p:txBody>
+      </p:sp>
+      <p:sp>
+        <p:nvSpPr>
+          <p:cNvPr id="3" name="Content Placeholder 2"/>
+          <p:cNvSpPr>
+            <a:spLocks noGrp="1"/>
+          </p:cNvSpPr>
+          <p:nvPr>
+            <p:ph idx="1"/>
+          </p:nvPr>
+        </p:nvSpPr>
+        <p:spPr/>
+        <p:txBody>
+          <a:bodyPr/>
+          <a:lstStyle/>
+          <a:p>
+            <a:r>
+              <a:rPr lang="en-US" dirty="0"/>
+              <a:t> </a:t>
+            </a:r>
+            <a:r>
+              <a:rPr lang="en-US" dirty="0" smtClean="0"/>
+              <a:t>When you push your changes, </a:t>
             </a:r>
             <a:r>
               <a:rPr lang="en-US" dirty="0" err="1" smtClean="0"/>
               <a:t>Git</a:t>
             </a:r>
-            <a:endParaRPr lang="en-US" dirty="0"/>
-          </a:p>
-        </p:txBody>
-      </p:sp>
-      <p:sp>
-        <p:nvSpPr>
-          <p:cNvPr id="3" name="Content Placeholder 2"/>
-          <p:cNvSpPr>
-            <a:spLocks noGrp="1"/>
-          </p:cNvSpPr>
-          <p:nvPr>
-            <p:ph idx="1"/>
-          </p:nvPr>
-        </p:nvSpPr>
-        <p:spPr/>
-        <p:txBody>
-          <a:bodyPr/>
-          <a:lstStyle/>
-          <a:p>
             <a:r>
               <a:rPr lang="en-US" dirty="0" smtClean="0"/>
-              <a:t> Write useful commit messages</a:t>
+              <a:t> merges your new additions with the repository, overwriting the old code with the new.</a:t>
             </a:r>
           </a:p>
           <a:p>
@@ -6109,37 +6259,15 @@
             </a:r>
             <a:r>
               <a:rPr lang="en-US" dirty="0" smtClean="0"/>
-              <a:t>Always pull before you push – it won’t let you anyway</a:t>
-            </a:r>
-          </a:p>
-          <a:p>
-            <a:r>
-              <a:rPr lang="en-US" dirty="0"/>
-              <a:t> </a:t>
+              <a:t>When more than one person has altered the same piece of code and push their respective work. </a:t>
+            </a:r>
+            <a:r>
+              <a:rPr lang="en-US" dirty="0" err="1" smtClean="0"/>
+              <a:t>Git</a:t>
             </a:r>
             <a:r>
               <a:rPr lang="en-US" dirty="0" smtClean="0"/>
-              <a:t>Re – cloning is not a way of fixing merge conflicts</a:t>
-            </a:r>
-          </a:p>
-          <a:p>
-            <a:r>
-              <a:rPr lang="en-US" dirty="0"/>
-              <a:t> </a:t>
-            </a:r>
-            <a:r>
-              <a:rPr lang="en-US" dirty="0" smtClean="0"/>
-              <a:t>Do not commit broken code – test beforehand</a:t>
-            </a:r>
-          </a:p>
-          <a:p>
-            <a:r>
-              <a:rPr lang="en-US" dirty="0"/>
-              <a:t> </a:t>
-            </a:r>
-            <a:r>
-              <a:rPr lang="en-US" dirty="0" smtClean="0"/>
-              <a:t>Commit often, push once</a:t>
+              <a:t> won’t know which one to use, causing a merge conflict.</a:t>
             </a:r>
             <a:endParaRPr lang="en-US" dirty="0"/>
           </a:p>
@@ -6148,7 +6276,7 @@
     </p:spTree>
     <p:extLst>
       <p:ext uri="{BB962C8B-B14F-4D97-AF65-F5344CB8AC3E}">
-        <p14:creationId xmlns:p14="http://schemas.microsoft.com/office/powerpoint/2010/main" val="1303282329"/>
+        <p14:creationId xmlns:p14="http://schemas.microsoft.com/office/powerpoint/2010/main" val="3471873061"/>
       </p:ext>
     </p:extLst>
   </p:cSld>

</xml_diff>